<commit_message>
Pseudocode and write up
</commit_message>
<xml_diff>
--- a/HGRN_pseudocode/HGRN_schematic2.pptx
+++ b/HGRN_pseudocode/HGRN_schematic2.pptx
@@ -259,7 +259,7 @@
           <a:p>
             <a:fld id="{07A1FB74-F1E5-47BB-899C-98CC94D5158C}" type="datetimeFigureOut">
               <a:rPr lang="en-US" smtClean="0"/>
-              <a:t>9/22/2023</a:t>
+              <a:t>9/27/2023</a:t>
             </a:fld>
             <a:endParaRPr lang="en-US"/>
           </a:p>
@@ -457,7 +457,7 @@
           <a:p>
             <a:fld id="{07A1FB74-F1E5-47BB-899C-98CC94D5158C}" type="datetimeFigureOut">
               <a:rPr lang="en-US" smtClean="0"/>
-              <a:t>9/22/2023</a:t>
+              <a:t>9/27/2023</a:t>
             </a:fld>
             <a:endParaRPr lang="en-US"/>
           </a:p>
@@ -665,7 +665,7 @@
           <a:p>
             <a:fld id="{07A1FB74-F1E5-47BB-899C-98CC94D5158C}" type="datetimeFigureOut">
               <a:rPr lang="en-US" smtClean="0"/>
-              <a:t>9/22/2023</a:t>
+              <a:t>9/27/2023</a:t>
             </a:fld>
             <a:endParaRPr lang="en-US"/>
           </a:p>
@@ -863,7 +863,7 @@
           <a:p>
             <a:fld id="{07A1FB74-F1E5-47BB-899C-98CC94D5158C}" type="datetimeFigureOut">
               <a:rPr lang="en-US" smtClean="0"/>
-              <a:t>9/22/2023</a:t>
+              <a:t>9/27/2023</a:t>
             </a:fld>
             <a:endParaRPr lang="en-US"/>
           </a:p>
@@ -1138,7 +1138,7 @@
           <a:p>
             <a:fld id="{07A1FB74-F1E5-47BB-899C-98CC94D5158C}" type="datetimeFigureOut">
               <a:rPr lang="en-US" smtClean="0"/>
-              <a:t>9/22/2023</a:t>
+              <a:t>9/27/2023</a:t>
             </a:fld>
             <a:endParaRPr lang="en-US"/>
           </a:p>
@@ -1403,7 +1403,7 @@
           <a:p>
             <a:fld id="{07A1FB74-F1E5-47BB-899C-98CC94D5158C}" type="datetimeFigureOut">
               <a:rPr lang="en-US" smtClean="0"/>
-              <a:t>9/22/2023</a:t>
+              <a:t>9/27/2023</a:t>
             </a:fld>
             <a:endParaRPr lang="en-US"/>
           </a:p>
@@ -1815,7 +1815,7 @@
           <a:p>
             <a:fld id="{07A1FB74-F1E5-47BB-899C-98CC94D5158C}" type="datetimeFigureOut">
               <a:rPr lang="en-US" smtClean="0"/>
-              <a:t>9/22/2023</a:t>
+              <a:t>9/27/2023</a:t>
             </a:fld>
             <a:endParaRPr lang="en-US"/>
           </a:p>
@@ -1956,7 +1956,7 @@
           <a:p>
             <a:fld id="{07A1FB74-F1E5-47BB-899C-98CC94D5158C}" type="datetimeFigureOut">
               <a:rPr lang="en-US" smtClean="0"/>
-              <a:t>9/22/2023</a:t>
+              <a:t>9/27/2023</a:t>
             </a:fld>
             <a:endParaRPr lang="en-US"/>
           </a:p>
@@ -2069,7 +2069,7 @@
           <a:p>
             <a:fld id="{07A1FB74-F1E5-47BB-899C-98CC94D5158C}" type="datetimeFigureOut">
               <a:rPr lang="en-US" smtClean="0"/>
-              <a:t>9/22/2023</a:t>
+              <a:t>9/27/2023</a:t>
             </a:fld>
             <a:endParaRPr lang="en-US"/>
           </a:p>
@@ -2380,7 +2380,7 @@
           <a:p>
             <a:fld id="{07A1FB74-F1E5-47BB-899C-98CC94D5158C}" type="datetimeFigureOut">
               <a:rPr lang="en-US" smtClean="0"/>
-              <a:t>9/22/2023</a:t>
+              <a:t>9/27/2023</a:t>
             </a:fld>
             <a:endParaRPr lang="en-US"/>
           </a:p>
@@ -2668,7 +2668,7 @@
           <a:p>
             <a:fld id="{07A1FB74-F1E5-47BB-899C-98CC94D5158C}" type="datetimeFigureOut">
               <a:rPr lang="en-US" smtClean="0"/>
-              <a:t>9/22/2023</a:t>
+              <a:t>9/27/2023</a:t>
             </a:fld>
             <a:endParaRPr lang="en-US"/>
           </a:p>
@@ -2909,7 +2909,7 @@
           <a:p>
             <a:fld id="{07A1FB74-F1E5-47BB-899C-98CC94D5158C}" type="datetimeFigureOut">
               <a:rPr lang="en-US" smtClean="0"/>
-              <a:t>9/22/2023</a:t>
+              <a:t>9/27/2023</a:t>
             </a:fld>
             <a:endParaRPr lang="en-US"/>
           </a:p>
@@ -4208,7 +4208,7 @@
                               </a:solidFill>
                               <a:latin typeface="Cambria Math" panose="02040503050406030204" pitchFamily="18" charset="0"/>
                             </a:rPr>
-                            <m:t>𝑬</m:t>
+                            <m:t>𝑯</m:t>
                           </m:r>
                         </m:e>
                         <m:sub>
@@ -4587,15 +4587,30 @@
                           </m:ctrlPr>
                         </m:sSubPr>
                         <m:e>
-                          <m:r>
-                            <a:rPr lang="en-US" b="1" i="1" smtClean="0">
-                              <a:solidFill>
-                                <a:schemeClr val="tx1"/>
-                              </a:solidFill>
-                              <a:latin typeface="Cambria Math" panose="02040503050406030204" pitchFamily="18" charset="0"/>
-                            </a:rPr>
-                            <m:t>𝑫</m:t>
-                          </m:r>
+                          <m:acc>
+                            <m:accPr>
+                              <m:chr m:val="̂"/>
+                              <m:ctrlPr>
+                                <a:rPr lang="en-US" b="1" i="1" smtClean="0">
+                                  <a:solidFill>
+                                    <a:schemeClr val="tx1"/>
+                                  </a:solidFill>
+                                  <a:latin typeface="Cambria Math" panose="02040503050406030204" pitchFamily="18" charset="0"/>
+                                </a:rPr>
+                              </m:ctrlPr>
+                            </m:accPr>
+                            <m:e>
+                              <m:r>
+                                <a:rPr lang="en-US" b="1" i="1" smtClean="0">
+                                  <a:solidFill>
+                                    <a:schemeClr val="tx1"/>
+                                  </a:solidFill>
+                                  <a:latin typeface="Cambria Math" panose="02040503050406030204" pitchFamily="18" charset="0"/>
+                                </a:rPr>
+                                <m:t>𝑯</m:t>
+                              </m:r>
+                            </m:e>
+                          </m:acc>
                         </m:e>
                         <m:sub>
                           <m:r>
@@ -4643,7 +4658,7 @@
               <a:blipFill>
                 <a:blip r:embed="rId13"/>
                 <a:stretch>
-                  <a:fillRect/>
+                  <a:fillRect r="-3200"/>
                 </a:stretch>
               </a:blipFill>
               <a:ln w="28575"/>
@@ -5242,7 +5257,7 @@
             <p:spPr>
               <a:xfrm>
                 <a:off x="6161278" y="1969313"/>
-                <a:ext cx="1499834" cy="338554"/>
+                <a:ext cx="1507849" cy="345223"/>
               </a:xfrm>
               <a:prstGeom prst="rect">
                 <a:avLst/>
@@ -5283,12 +5298,24 @@
                           </m:ctrlPr>
                         </m:sSubPr>
                         <m:e>
-                          <m:r>
-                            <a:rPr lang="en-US" sz="1600" b="1" i="1" smtClean="0">
-                              <a:latin typeface="Cambria Math" panose="02040503050406030204" pitchFamily="18" charset="0"/>
-                            </a:rPr>
-                            <m:t>𝑫</m:t>
-                          </m:r>
+                          <m:acc>
+                            <m:accPr>
+                              <m:chr m:val="̂"/>
+                              <m:ctrlPr>
+                                <a:rPr lang="en-US" sz="1600" b="1" i="1" smtClean="0">
+                                  <a:latin typeface="Cambria Math" panose="02040503050406030204" pitchFamily="18" charset="0"/>
+                                </a:rPr>
+                              </m:ctrlPr>
+                            </m:accPr>
+                            <m:e>
+                              <m:r>
+                                <a:rPr lang="en-US" sz="1600" b="1" i="1" smtClean="0">
+                                  <a:latin typeface="Cambria Math" panose="02040503050406030204" pitchFamily="18" charset="0"/>
+                                </a:rPr>
+                                <m:t>𝑯</m:t>
+                              </m:r>
+                            </m:e>
+                          </m:acc>
                         </m:e>
                         <m:sub>
                           <m:r>
@@ -5355,7 +5382,7 @@
             <p:spPr>
               <a:xfrm>
                 <a:off x="6161278" y="1969313"/>
-                <a:ext cx="1499834" cy="338554"/>
+                <a:ext cx="1507849" cy="345223"/>
               </a:xfrm>
               <a:prstGeom prst="rect">
                 <a:avLst/>
@@ -5363,7 +5390,7 @@
               <a:blipFill>
                 <a:blip r:embed="rId16"/>
                 <a:stretch>
-                  <a:fillRect b="-8929"/>
+                  <a:fillRect b="-10526"/>
                 </a:stretch>
               </a:blipFill>
             </p:spPr>
@@ -5423,8 +5450,8 @@
           </a:fontRef>
         </p:style>
       </p:cxnSp>
-      <mc:AlternateContent xmlns:mc="http://schemas.openxmlformats.org/markup-compatibility/2006">
-        <mc:Choice xmlns:a14="http://schemas.microsoft.com/office/drawing/2010/main" Requires="a14">
+      <mc:AlternateContent xmlns:mc="http://schemas.openxmlformats.org/markup-compatibility/2006" xmlns:a14="http://schemas.microsoft.com/office/drawing/2010/main">
+        <mc:Choice Requires="a14">
           <p:sp>
             <p:nvSpPr>
               <p:cNvPr id="97" name="TextBox 96">
@@ -5519,7 +5546,7 @@
             </p:txBody>
           </p:sp>
         </mc:Choice>
-        <mc:Fallback>
+        <mc:Fallback xmlns="">
           <p:sp>
             <p:nvSpPr>
               <p:cNvPr id="97" name="TextBox 96">
@@ -5673,8 +5700,8 @@
             </a:p>
           </p:txBody>
         </p:sp>
-        <mc:AlternateContent xmlns:mc="http://schemas.openxmlformats.org/markup-compatibility/2006">
-          <mc:Choice xmlns:a14="http://schemas.microsoft.com/office/drawing/2010/main" Requires="a14">
+        <mc:AlternateContent xmlns:mc="http://schemas.openxmlformats.org/markup-compatibility/2006" xmlns:a14="http://schemas.microsoft.com/office/drawing/2010/main">
+          <mc:Choice Requires="a14">
             <p:sp>
               <p:nvSpPr>
                 <p:cNvPr id="22" name="TextBox 21">
@@ -5845,7 +5872,7 @@
               </p:txBody>
             </p:sp>
           </mc:Choice>
-          <mc:Fallback>
+          <mc:Fallback xmlns="">
             <p:sp>
               <p:nvSpPr>
                 <p:cNvPr id="22" name="TextBox 21">
@@ -5890,8 +5917,8 @@
             </p:sp>
           </mc:Fallback>
         </mc:AlternateContent>
-        <mc:AlternateContent xmlns:mc="http://schemas.openxmlformats.org/markup-compatibility/2006">
-          <mc:Choice xmlns:a14="http://schemas.microsoft.com/office/drawing/2010/main" Requires="a14">
+        <mc:AlternateContent xmlns:mc="http://schemas.openxmlformats.org/markup-compatibility/2006" xmlns:a14="http://schemas.microsoft.com/office/drawing/2010/main">
+          <mc:Choice Requires="a14">
             <p:sp>
               <p:nvSpPr>
                 <p:cNvPr id="6" name="TextBox 5">
@@ -5991,7 +6018,7 @@
               </p:txBody>
             </p:sp>
           </mc:Choice>
-          <mc:Fallback>
+          <mc:Fallback xmlns="">
             <p:sp>
               <p:nvSpPr>
                 <p:cNvPr id="6" name="TextBox 5">
@@ -6036,8 +6063,8 @@
             </p:sp>
           </mc:Fallback>
         </mc:AlternateContent>
-        <mc:AlternateContent xmlns:mc="http://schemas.openxmlformats.org/markup-compatibility/2006">
-          <mc:Choice xmlns:a14="http://schemas.microsoft.com/office/drawing/2010/main" Requires="a14">
+        <mc:AlternateContent xmlns:mc="http://schemas.openxmlformats.org/markup-compatibility/2006" xmlns:a14="http://schemas.microsoft.com/office/drawing/2010/main">
+          <mc:Choice Requires="a14">
             <p:sp>
               <p:nvSpPr>
                 <p:cNvPr id="7" name="TextBox 6">
@@ -6137,7 +6164,7 @@
               </p:txBody>
             </p:sp>
           </mc:Choice>
-          <mc:Fallback>
+          <mc:Fallback xmlns="">
             <p:sp>
               <p:nvSpPr>
                 <p:cNvPr id="7" name="TextBox 6">
@@ -6182,8 +6209,8 @@
             </p:sp>
           </mc:Fallback>
         </mc:AlternateContent>
-        <mc:AlternateContent xmlns:mc="http://schemas.openxmlformats.org/markup-compatibility/2006">
-          <mc:Choice xmlns:a14="http://schemas.microsoft.com/office/drawing/2010/main" Requires="a14">
+        <mc:AlternateContent xmlns:mc="http://schemas.openxmlformats.org/markup-compatibility/2006" xmlns:a14="http://schemas.microsoft.com/office/drawing/2010/main">
+          <mc:Choice Requires="a14">
             <p:sp>
               <p:nvSpPr>
                 <p:cNvPr id="31" name="TextBox 30">
@@ -6281,7 +6308,7 @@
               </p:txBody>
             </p:sp>
           </mc:Choice>
-          <mc:Fallback>
+          <mc:Fallback xmlns="">
             <p:sp>
               <p:nvSpPr>
                 <p:cNvPr id="31" name="TextBox 30">
@@ -6326,8 +6353,8 @@
             </p:sp>
           </mc:Fallback>
         </mc:AlternateContent>
-        <mc:AlternateContent xmlns:mc="http://schemas.openxmlformats.org/markup-compatibility/2006">
-          <mc:Choice xmlns:a14="http://schemas.microsoft.com/office/drawing/2010/main" Requires="a14">
+        <mc:AlternateContent xmlns:mc="http://schemas.openxmlformats.org/markup-compatibility/2006" xmlns:a14="http://schemas.microsoft.com/office/drawing/2010/main">
+          <mc:Choice Requires="a14">
             <p:sp>
               <p:nvSpPr>
                 <p:cNvPr id="40" name="TextBox 39">
@@ -6343,7 +6370,7 @@
               <p:spPr>
                 <a:xfrm>
                   <a:off x="2810359" y="1337723"/>
-                  <a:ext cx="1123449" cy="250646"/>
+                  <a:ext cx="1137876" cy="250646"/>
                 </a:xfrm>
                 <a:prstGeom prst="rect">
                   <a:avLst/>
@@ -6376,7 +6403,7 @@
                               <a:rPr lang="en-US" sz="1600" b="1" i="1" smtClean="0">
                                 <a:latin typeface="Cambria Math" panose="02040503050406030204" pitchFamily="18" charset="0"/>
                               </a:rPr>
-                              <m:t>𝑬</m:t>
+                              <m:t>𝑯</m:t>
                             </m:r>
                           </m:e>
                           <m:sub>
@@ -6465,7 +6492,7 @@
               </p:txBody>
             </p:sp>
           </mc:Choice>
-          <mc:Fallback>
+          <mc:Fallback xmlns="">
             <p:sp>
               <p:nvSpPr>
                 <p:cNvPr id="40" name="TextBox 39">
@@ -6483,7 +6510,7 @@
               <p:spPr>
                 <a:xfrm>
                   <a:off x="2810359" y="1337723"/>
-                  <a:ext cx="1123449" cy="250646"/>
+                  <a:ext cx="1137876" cy="250646"/>
                 </a:xfrm>
                 <a:prstGeom prst="rect">
                   <a:avLst/>
@@ -6491,7 +6518,7 @@
                 <a:blipFill>
                   <a:blip r:embed="rId22"/>
                   <a:stretch>
-                    <a:fillRect l="-1630" b="-14286"/>
+                    <a:fillRect l="-2139" b="-14286"/>
                   </a:stretch>
                 </a:blipFill>
               </p:spPr>
@@ -6510,8 +6537,8 @@
             </p:sp>
           </mc:Fallback>
         </mc:AlternateContent>
-        <mc:AlternateContent xmlns:mc="http://schemas.openxmlformats.org/markup-compatibility/2006">
-          <mc:Choice xmlns:a14="http://schemas.microsoft.com/office/drawing/2010/main" Requires="a14">
+        <mc:AlternateContent xmlns:mc="http://schemas.openxmlformats.org/markup-compatibility/2006" xmlns:a14="http://schemas.microsoft.com/office/drawing/2010/main">
+          <mc:Choice Requires="a14">
             <p:sp>
               <p:nvSpPr>
                 <p:cNvPr id="44" name="TextBox 43">
@@ -6527,7 +6554,7 @@
               <p:spPr>
                 <a:xfrm>
                   <a:off x="7860175" y="1261446"/>
-                  <a:ext cx="1063196" cy="246221"/>
+                  <a:ext cx="1063196" cy="252890"/>
                 </a:xfrm>
                 <a:prstGeom prst="rect">
                   <a:avLst/>
@@ -6556,12 +6583,24 @@
                             </m:ctrlPr>
                           </m:sSubPr>
                           <m:e>
-                            <m:r>
-                              <a:rPr lang="en-US" sz="1600" b="1" i="1" smtClean="0">
-                                <a:latin typeface="Cambria Math" panose="02040503050406030204" pitchFamily="18" charset="0"/>
-                              </a:rPr>
-                              <m:t>𝑫</m:t>
-                            </m:r>
+                            <m:acc>
+                              <m:accPr>
+                                <m:chr m:val="̂"/>
+                                <m:ctrlPr>
+                                  <a:rPr lang="en-US" sz="1600" b="1" i="1" smtClean="0">
+                                    <a:latin typeface="Cambria Math" panose="02040503050406030204" pitchFamily="18" charset="0"/>
+                                  </a:rPr>
+                                </m:ctrlPr>
+                              </m:accPr>
+                              <m:e>
+                                <m:r>
+                                  <a:rPr lang="en-US" sz="1600" b="1" i="1" smtClean="0">
+                                    <a:latin typeface="Cambria Math" panose="02040503050406030204" pitchFamily="18" charset="0"/>
+                                  </a:rPr>
+                                  <m:t>𝑯</m:t>
+                                </m:r>
+                              </m:e>
+                            </m:acc>
                           </m:e>
                           <m:sub>
                             <m:r>
@@ -6628,7 +6667,7 @@
               </p:txBody>
             </p:sp>
           </mc:Choice>
-          <mc:Fallback>
+          <mc:Fallback xmlns="">
             <p:sp>
               <p:nvSpPr>
                 <p:cNvPr id="44" name="TextBox 43">
@@ -6646,7 +6685,7 @@
               <p:spPr>
                 <a:xfrm>
                   <a:off x="7860175" y="1261446"/>
-                  <a:ext cx="1063196" cy="246221"/>
+                  <a:ext cx="1063196" cy="252890"/>
                 </a:xfrm>
                 <a:prstGeom prst="rect">
                   <a:avLst/>
@@ -6654,7 +6693,7 @@
                 <a:blipFill>
                   <a:blip r:embed="rId23"/>
                   <a:stretch>
-                    <a:fillRect l="-4000" r="-1143" b="-10000"/>
+                    <a:fillRect l="-4571" t="-19512" r="-1714" b="-12195"/>
                   </a:stretch>
                 </a:blipFill>
               </p:spPr>
@@ -6673,8 +6712,8 @@
             </p:sp>
           </mc:Fallback>
         </mc:AlternateContent>
-        <mc:AlternateContent xmlns:mc="http://schemas.openxmlformats.org/markup-compatibility/2006">
-          <mc:Choice xmlns:a14="http://schemas.microsoft.com/office/drawing/2010/main" Requires="a14">
+        <mc:AlternateContent xmlns:mc="http://schemas.openxmlformats.org/markup-compatibility/2006" xmlns:a14="http://schemas.microsoft.com/office/drawing/2010/main">
+          <mc:Choice Requires="a14">
             <p:sp>
               <p:nvSpPr>
                 <p:cNvPr id="52" name="TextBox 51">
@@ -6786,7 +6825,7 @@
               </p:txBody>
             </p:sp>
           </mc:Choice>
-          <mc:Fallback>
+          <mc:Fallback xmlns="">
             <p:sp>
               <p:nvSpPr>
                 <p:cNvPr id="52" name="TextBox 51">
@@ -6831,8 +6870,8 @@
             </p:sp>
           </mc:Fallback>
         </mc:AlternateContent>
-        <mc:AlternateContent xmlns:mc="http://schemas.openxmlformats.org/markup-compatibility/2006">
-          <mc:Choice xmlns:a14="http://schemas.microsoft.com/office/drawing/2010/main" Requires="a14">
+        <mc:AlternateContent xmlns:mc="http://schemas.openxmlformats.org/markup-compatibility/2006" xmlns:a14="http://schemas.microsoft.com/office/drawing/2010/main">
+          <mc:Choice Requires="a14">
             <p:sp>
               <p:nvSpPr>
                 <p:cNvPr id="90" name="TextBox 89">
@@ -6848,7 +6887,7 @@
               <p:spPr>
                 <a:xfrm>
                   <a:off x="186876" y="4406980"/>
-                  <a:ext cx="1177950" cy="250646"/>
+                  <a:ext cx="1129860" cy="250646"/>
                 </a:xfrm>
                 <a:prstGeom prst="rect">
                   <a:avLst/>
@@ -6881,7 +6920,7 @@
                               <a:rPr lang="en-US" sz="1600" b="1" i="1" smtClean="0">
                                 <a:latin typeface="Cambria Math" panose="02040503050406030204" pitchFamily="18" charset="0"/>
                               </a:rPr>
-                              <m:t>𝑯</m:t>
+                              <m:t>𝑷</m:t>
                             </m:r>
                           </m:e>
                           <m:sub>
@@ -6970,7 +7009,7 @@
               </p:txBody>
             </p:sp>
           </mc:Choice>
-          <mc:Fallback>
+          <mc:Fallback xmlns="">
             <p:sp>
               <p:nvSpPr>
                 <p:cNvPr id="90" name="TextBox 89">
@@ -6988,7 +7027,7 @@
               <p:spPr>
                 <a:xfrm>
                   <a:off x="186876" y="4406980"/>
-                  <a:ext cx="1177950" cy="250646"/>
+                  <a:ext cx="1129860" cy="250646"/>
                 </a:xfrm>
                 <a:prstGeom prst="rect">
                   <a:avLst/>
@@ -6996,7 +7035,7 @@
                 <a:blipFill>
                   <a:blip r:embed="rId25"/>
                   <a:stretch>
-                    <a:fillRect l="-2591" t="-2439" b="-14634"/>
+                    <a:fillRect l="-3784" t="-2439" b="-14634"/>
                   </a:stretch>
                 </a:blipFill>
               </p:spPr>
@@ -7015,8 +7054,8 @@
             </p:sp>
           </mc:Fallback>
         </mc:AlternateContent>
-        <mc:AlternateContent xmlns:mc="http://schemas.openxmlformats.org/markup-compatibility/2006">
-          <mc:Choice xmlns:a14="http://schemas.microsoft.com/office/drawing/2010/main" Requires="a14">
+        <mc:AlternateContent xmlns:mc="http://schemas.openxmlformats.org/markup-compatibility/2006" xmlns:a14="http://schemas.microsoft.com/office/drawing/2010/main">
+          <mc:Choice Requires="a14">
             <p:sp>
               <p:nvSpPr>
                 <p:cNvPr id="91" name="TextBox 90">
@@ -7158,7 +7197,7 @@
               </p:txBody>
             </p:sp>
           </mc:Choice>
-          <mc:Fallback>
+          <mc:Fallback xmlns="">
             <p:sp>
               <p:nvSpPr>
                 <p:cNvPr id="91" name="TextBox 90">
@@ -7203,8 +7242,8 @@
             </p:sp>
           </mc:Fallback>
         </mc:AlternateContent>
-        <mc:AlternateContent xmlns:mc="http://schemas.openxmlformats.org/markup-compatibility/2006">
-          <mc:Choice xmlns:a14="http://schemas.microsoft.com/office/drawing/2010/main" Requires="a14">
+        <mc:AlternateContent xmlns:mc="http://schemas.openxmlformats.org/markup-compatibility/2006" xmlns:a14="http://schemas.microsoft.com/office/drawing/2010/main">
+          <mc:Choice Requires="a14">
             <p:sp>
               <p:nvSpPr>
                 <p:cNvPr id="130" name="TextBox 129">
@@ -7363,7 +7402,7 @@
               </p:txBody>
             </p:sp>
           </mc:Choice>
-          <mc:Fallback>
+          <mc:Fallback xmlns="">
             <p:sp>
               <p:nvSpPr>
                 <p:cNvPr id="130" name="TextBox 129">
@@ -7408,8 +7447,8 @@
             </p:sp>
           </mc:Fallback>
         </mc:AlternateContent>
-        <mc:AlternateContent xmlns:mc="http://schemas.openxmlformats.org/markup-compatibility/2006">
-          <mc:Choice xmlns:a14="http://schemas.microsoft.com/office/drawing/2010/main" Requires="a14">
+        <mc:AlternateContent xmlns:mc="http://schemas.openxmlformats.org/markup-compatibility/2006" xmlns:a14="http://schemas.microsoft.com/office/drawing/2010/main">
+          <mc:Choice Requires="a14">
             <p:sp>
               <p:nvSpPr>
                 <p:cNvPr id="131" name="TextBox 130">
@@ -7551,7 +7590,7 @@
               </p:txBody>
             </p:sp>
           </mc:Choice>
-          <mc:Fallback>
+          <mc:Fallback xmlns="">
             <p:sp>
               <p:nvSpPr>
                 <p:cNvPr id="131" name="TextBox 130">
@@ -7612,13 +7651,13 @@
         <p:grpSpPr>
           <a:xfrm>
             <a:off x="3134371" y="2969166"/>
-            <a:ext cx="8904576" cy="3695303"/>
+            <a:ext cx="8991280" cy="3695303"/>
             <a:chOff x="3120413" y="3092321"/>
-            <a:chExt cx="8904576" cy="3695303"/>
+            <a:chExt cx="8991280" cy="3695303"/>
           </a:xfrm>
         </p:grpSpPr>
-        <mc:AlternateContent xmlns:mc="http://schemas.openxmlformats.org/markup-compatibility/2006">
-          <mc:Choice xmlns:a14="http://schemas.microsoft.com/office/drawing/2010/main" Requires="a14">
+        <mc:AlternateContent xmlns:mc="http://schemas.openxmlformats.org/markup-compatibility/2006" xmlns:a14="http://schemas.microsoft.com/office/drawing/2010/main">
+          <mc:Choice Requires="a14">
             <p:sp>
               <p:nvSpPr>
                 <p:cNvPr id="32" name="TextBox 31">
@@ -7722,7 +7761,7 @@
               </p:txBody>
             </p:sp>
           </mc:Choice>
-          <mc:Fallback>
+          <mc:Fallback xmlns="">
             <p:sp>
               <p:nvSpPr>
                 <p:cNvPr id="32" name="TextBox 31">
@@ -7808,8 +7847,8 @@
             </a:fontRef>
           </p:style>
         </p:cxnSp>
-        <mc:AlternateContent xmlns:mc="http://schemas.openxmlformats.org/markup-compatibility/2006">
-          <mc:Choice xmlns:a14="http://schemas.microsoft.com/office/drawing/2010/main" Requires="a14">
+        <mc:AlternateContent xmlns:mc="http://schemas.openxmlformats.org/markup-compatibility/2006" xmlns:a14="http://schemas.microsoft.com/office/drawing/2010/main">
+          <mc:Choice Requires="a14">
             <p:sp>
               <p:nvSpPr>
                 <p:cNvPr id="34" name="Rectangle 33">
@@ -7884,7 +7923,7 @@
                                 </a:solidFill>
                                 <a:latin typeface="Cambria Math" panose="02040503050406030204" pitchFamily="18" charset="0"/>
                               </a:rPr>
-                              <m:t>𝑯</m:t>
+                              <m:t>𝑷</m:t>
                             </m:r>
                           </m:e>
                           <m:sub>
@@ -7911,7 +7950,7 @@
               </p:txBody>
             </p:sp>
           </mc:Choice>
-          <mc:Fallback>
+          <mc:Fallback xmlns="">
             <p:sp>
               <p:nvSpPr>
                 <p:cNvPr id="34" name="Rectangle 33">
@@ -8089,8 +8128,8 @@
             </a:p>
           </p:txBody>
         </p:sp>
-        <mc:AlternateContent xmlns:mc="http://schemas.openxmlformats.org/markup-compatibility/2006">
-          <mc:Choice xmlns:a14="http://schemas.microsoft.com/office/drawing/2010/main" Requires="a14">
+        <mc:AlternateContent xmlns:mc="http://schemas.openxmlformats.org/markup-compatibility/2006" xmlns:a14="http://schemas.microsoft.com/office/drawing/2010/main">
+          <mc:Choice Requires="a14">
             <p:sp>
               <p:nvSpPr>
                 <p:cNvPr id="47" name="TextBox 46">
@@ -8227,7 +8266,7 @@
               </p:txBody>
             </p:sp>
           </mc:Choice>
-          <mc:Fallback>
+          <mc:Fallback xmlns="">
             <p:sp>
               <p:nvSpPr>
                 <p:cNvPr id="47" name="TextBox 46">
@@ -8272,8 +8311,8 @@
             </p:sp>
           </mc:Fallback>
         </mc:AlternateContent>
-        <mc:AlternateContent xmlns:mc="http://schemas.openxmlformats.org/markup-compatibility/2006">
-          <mc:Choice xmlns:a14="http://schemas.microsoft.com/office/drawing/2010/main" Requires="a14">
+        <mc:AlternateContent xmlns:mc="http://schemas.openxmlformats.org/markup-compatibility/2006" xmlns:a14="http://schemas.microsoft.com/office/drawing/2010/main">
+          <mc:Choice Requires="a14">
             <p:sp>
               <p:nvSpPr>
                 <p:cNvPr id="73" name="Rectangle 72">
@@ -8378,7 +8417,7 @@
               </p:txBody>
             </p:sp>
           </mc:Choice>
-          <mc:Fallback>
+          <mc:Fallback xmlns="">
             <p:sp>
               <p:nvSpPr>
                 <p:cNvPr id="73" name="Rectangle 72">
@@ -8556,8 +8595,8 @@
             </a:p>
           </p:txBody>
         </p:sp>
-        <mc:AlternateContent xmlns:mc="http://schemas.openxmlformats.org/markup-compatibility/2006">
-          <mc:Choice xmlns:a14="http://schemas.microsoft.com/office/drawing/2010/main" Requires="a14">
+        <mc:AlternateContent xmlns:mc="http://schemas.openxmlformats.org/markup-compatibility/2006" xmlns:a14="http://schemas.microsoft.com/office/drawing/2010/main">
+          <mc:Choice Requires="a14">
             <p:sp>
               <p:nvSpPr>
                 <p:cNvPr id="14" name="TextBox 13">
@@ -8572,8 +8611,8 @@
               </p:nvSpPr>
               <p:spPr>
                 <a:xfrm>
-                  <a:off x="6220293" y="5085356"/>
-                  <a:ext cx="1728485" cy="419025"/>
+                  <a:off x="6193923" y="5114059"/>
+                  <a:ext cx="1760547" cy="419025"/>
                 </a:xfrm>
                 <a:prstGeom prst="rect">
                   <a:avLst/>
@@ -8593,20 +8632,14 @@
                         <m:jc m:val="centerGroup"/>
                       </m:oMathParaPr>
                       <m:oMath xmlns:m="http://schemas.openxmlformats.org/officeDocument/2006/math">
-                        <m:r>
-                          <a:rPr lang="en-US" sz="1600" b="1" i="1" smtClean="0">
-                            <a:latin typeface="Cambria Math" panose="02040503050406030204" pitchFamily="18" charset="0"/>
-                          </a:rPr>
-                          <m:t> </m:t>
-                        </m:r>
-                        <m:sSub>
-                          <m:sSubPr>
+                        <m:sSup>
+                          <m:sSupPr>
                             <m:ctrlPr>
                               <a:rPr lang="en-US" sz="1600" b="1" i="1" smtClean="0">
                                 <a:latin typeface="Cambria Math" panose="02040503050406030204" pitchFamily="18" charset="0"/>
                               </a:rPr>
                             </m:ctrlPr>
-                          </m:sSubPr>
+                          </m:sSupPr>
                           <m:e>
                             <m:acc>
                               <m:accPr>
@@ -8627,15 +8660,27 @@
                               </m:e>
                             </m:acc>
                           </m:e>
-                          <m:sub>
+                          <m:sup>
+                            <m:r>
+                              <a:rPr lang="en-US" sz="1600" b="1" i="1">
+                                <a:latin typeface="Cambria Math" panose="02040503050406030204" pitchFamily="18" charset="0"/>
+                              </a:rPr>
+                              <m:t>(</m:t>
+                            </m:r>
                             <m:r>
                               <a:rPr lang="en-US" sz="1600" b="1" i="1" smtClean="0">
                                 <a:latin typeface="Cambria Math" panose="02040503050406030204" pitchFamily="18" charset="0"/>
                               </a:rPr>
                               <m:t>𝟏</m:t>
                             </m:r>
-                          </m:sub>
-                        </m:sSub>
+                            <m:r>
+                              <a:rPr lang="en-US" sz="1600" b="1" i="1">
+                                <a:latin typeface="Cambria Math" panose="02040503050406030204" pitchFamily="18" charset="0"/>
+                              </a:rPr>
+                              <m:t>)</m:t>
+                            </m:r>
+                          </m:sup>
+                        </m:sSup>
                         <m:r>
                           <a:rPr lang="en-US" sz="1600" b="0" i="1" smtClean="0">
                             <a:latin typeface="Cambria Math" panose="02040503050406030204" pitchFamily="18" charset="0"/>
@@ -8704,7 +8749,7 @@
                                       <a:rPr lang="en-US" sz="1600" b="1" i="1" smtClean="0">
                                         <a:latin typeface="Cambria Math" panose="02040503050406030204" pitchFamily="18" charset="0"/>
                                       </a:rPr>
-                                      <m:t>𝑯</m:t>
+                                      <m:t>𝑷</m:t>
                                     </m:r>
                                   </m:e>
                                   <m:sub>
@@ -8736,7 +8781,7 @@
               </p:txBody>
             </p:sp>
           </mc:Choice>
-          <mc:Fallback>
+          <mc:Fallback xmlns="">
             <p:sp>
               <p:nvSpPr>
                 <p:cNvPr id="14" name="TextBox 13">
@@ -8753,8 +8798,8 @@
               </p:nvSpPr>
               <p:spPr>
                 <a:xfrm>
-                  <a:off x="6220293" y="5085356"/>
-                  <a:ext cx="1728485" cy="419025"/>
+                  <a:off x="6193923" y="5114059"/>
+                  <a:ext cx="1760547" cy="419025"/>
                 </a:xfrm>
                 <a:prstGeom prst="rect">
                   <a:avLst/>
@@ -8762,7 +8807,7 @@
                 <a:blipFill>
                   <a:blip r:embed="rId33"/>
                   <a:stretch>
-                    <a:fillRect b="-4348"/>
+                    <a:fillRect b="-5882"/>
                   </a:stretch>
                 </a:blipFill>
               </p:spPr>
@@ -8945,8 +8990,8 @@
             </a:fontRef>
           </p:style>
         </p:cxnSp>
-        <mc:AlternateContent xmlns:mc="http://schemas.openxmlformats.org/markup-compatibility/2006">
-          <mc:Choice xmlns:a14="http://schemas.microsoft.com/office/drawing/2010/main" Requires="a14">
+        <mc:AlternateContent xmlns:mc="http://schemas.openxmlformats.org/markup-compatibility/2006" xmlns:a14="http://schemas.microsoft.com/office/drawing/2010/main">
+          <mc:Choice Requires="a14">
             <p:sp>
               <p:nvSpPr>
                 <p:cNvPr id="85" name="Rectangle 84">
@@ -9021,7 +9066,7 @@
                                 </a:solidFill>
                                 <a:latin typeface="Cambria Math" panose="02040503050406030204" pitchFamily="18" charset="0"/>
                               </a:rPr>
-                              <m:t>𝑯</m:t>
+                              <m:t>𝑷</m:t>
                             </m:r>
                           </m:e>
                           <m:sub>
@@ -9048,7 +9093,7 @@
               </p:txBody>
             </p:sp>
           </mc:Choice>
-          <mc:Fallback>
+          <mc:Fallback xmlns="">
             <p:sp>
               <p:nvSpPr>
                 <p:cNvPr id="85" name="Rectangle 84">
@@ -9094,8 +9139,8 @@
             </p:sp>
           </mc:Fallback>
         </mc:AlternateContent>
-        <mc:AlternateContent xmlns:mc="http://schemas.openxmlformats.org/markup-compatibility/2006">
-          <mc:Choice xmlns:a14="http://schemas.microsoft.com/office/drawing/2010/main" Requires="a14">
+        <mc:AlternateContent xmlns:mc="http://schemas.openxmlformats.org/markup-compatibility/2006" xmlns:a14="http://schemas.microsoft.com/office/drawing/2010/main">
+          <mc:Choice Requires="a14">
             <p:sp>
               <p:nvSpPr>
                 <p:cNvPr id="87" name="Rectangle 86">
@@ -9200,7 +9245,7 @@
               </p:txBody>
             </p:sp>
           </mc:Choice>
-          <mc:Fallback>
+          <mc:Fallback xmlns="">
             <p:sp>
               <p:nvSpPr>
                 <p:cNvPr id="87" name="Rectangle 86">
@@ -9246,8 +9291,8 @@
             </p:sp>
           </mc:Fallback>
         </mc:AlternateContent>
-        <mc:AlternateContent xmlns:mc="http://schemas.openxmlformats.org/markup-compatibility/2006">
-          <mc:Choice xmlns:a14="http://schemas.microsoft.com/office/drawing/2010/main" Requires="a14">
+        <mc:AlternateContent xmlns:mc="http://schemas.openxmlformats.org/markup-compatibility/2006" xmlns:a14="http://schemas.microsoft.com/office/drawing/2010/main">
+          <mc:Choice Requires="a14">
             <p:sp>
               <p:nvSpPr>
                 <p:cNvPr id="101" name="TextBox 100">
@@ -9262,8 +9307,8 @@
               </p:nvSpPr>
               <p:spPr>
                 <a:xfrm>
-                  <a:off x="10494057" y="3786198"/>
-                  <a:ext cx="1530932" cy="326693"/>
+                  <a:off x="10147491" y="3776851"/>
+                  <a:ext cx="1930528" cy="417230"/>
                 </a:xfrm>
                 <a:prstGeom prst="rect">
                   <a:avLst/>
@@ -9283,20 +9328,20 @@
                         <m:jc m:val="centerGroup"/>
                       </m:oMathParaPr>
                       <m:oMath xmlns:m="http://schemas.openxmlformats.org/officeDocument/2006/math">
-                        <m:sSub>
-                          <m:sSubPr>
+                        <m:sSup>
+                          <m:sSupPr>
                             <m:ctrlPr>
-                              <a:rPr lang="en-US" sz="1600" b="0" i="1" smtClean="0">
+                              <a:rPr lang="en-US" sz="1600" b="1" i="1" smtClean="0">
                                 <a:latin typeface="Cambria Math" panose="02040503050406030204" pitchFamily="18" charset="0"/>
                               </a:rPr>
                             </m:ctrlPr>
-                          </m:sSubPr>
+                          </m:sSupPr>
                           <m:e>
                             <m:acc>
                               <m:accPr>
                                 <m:chr m:val="̃"/>
                                 <m:ctrlPr>
-                                  <a:rPr lang="en-US" sz="1600" b="0" i="1" smtClean="0">
+                                  <a:rPr lang="en-US" sz="1600" b="1" i="1">
                                     <a:latin typeface="Cambria Math" panose="02040503050406030204" pitchFamily="18" charset="0"/>
                                   </a:rPr>
                                 </m:ctrlPr>
@@ -9311,15 +9356,27 @@
                               </m:e>
                             </m:acc>
                           </m:e>
-                          <m:sub>
+                          <m:sup>
                             <m:r>
-                              <a:rPr lang="en-US" sz="1600" b="0" i="1" smtClean="0">
-                                <a:latin typeface="Cambria Math" panose="02040503050406030204" pitchFamily="18" charset="0"/>
-                              </a:rPr>
-                              <m:t>2</m:t>
+                              <a:rPr lang="en-US" sz="1600" b="1" i="1">
+                                <a:latin typeface="Cambria Math" panose="02040503050406030204" pitchFamily="18" charset="0"/>
+                              </a:rPr>
+                              <m:t>(</m:t>
                             </m:r>
-                          </m:sub>
-                        </m:sSub>
+                            <m:r>
+                              <a:rPr lang="en-US" sz="1600" b="1" i="1">
+                                <a:latin typeface="Cambria Math" panose="02040503050406030204" pitchFamily="18" charset="0"/>
+                              </a:rPr>
+                              <m:t>𝟐</m:t>
+                            </m:r>
+                            <m:r>
+                              <a:rPr lang="en-US" sz="1600" b="1" i="1">
+                                <a:latin typeface="Cambria Math" panose="02040503050406030204" pitchFamily="18" charset="0"/>
+                              </a:rPr>
+                              <m:t>)</m:t>
+                            </m:r>
+                          </m:sup>
+                        </m:sSup>
                         <m:r>
                           <a:rPr lang="en-US" sz="1600" b="0" i="1" smtClean="0">
                             <a:latin typeface="Cambria Math" panose="02040503050406030204" pitchFamily="18" charset="0"/>
@@ -9350,51 +9407,61 @@
                                 </m:ctrlPr>
                               </m:dPr>
                               <m:e>
-                                <m:sSubSup>
-                                  <m:sSubSupPr>
+                                <m:sSup>
+                                  <m:sSupPr>
                                     <m:ctrlPr>
+                                      <a:rPr lang="en-US" sz="1600" b="1" i="1">
+                                        <a:latin typeface="Cambria Math" panose="02040503050406030204" pitchFamily="18" charset="0"/>
+                                      </a:rPr>
+                                    </m:ctrlPr>
+                                  </m:sSupPr>
+                                  <m:e>
+                                    <m:r>
                                       <a:rPr lang="en-US" sz="1600" b="1" i="1" smtClean="0">
                                         <a:latin typeface="Cambria Math" panose="02040503050406030204" pitchFamily="18" charset="0"/>
                                       </a:rPr>
-                                    </m:ctrlPr>
-                                  </m:sSubSupPr>
-                                  <m:e>
-                                    <m:acc>
-                                      <m:accPr>
-                                        <m:chr m:val="̃"/>
+                                      <m:t>𝑿</m:t>
+                                    </m:r>
+                                  </m:e>
+                                  <m:sup>
+                                    <m:sSup>
+                                      <m:sSupPr>
                                         <m:ctrlPr>
                                           <a:rPr lang="en-US" sz="1600" b="1" i="1" smtClean="0">
                                             <a:latin typeface="Cambria Math" panose="02040503050406030204" pitchFamily="18" charset="0"/>
                                           </a:rPr>
                                         </m:ctrlPr>
-                                      </m:accPr>
+                                      </m:sSupPr>
                                       <m:e>
+                                        <m:d>
+                                          <m:dPr>
+                                            <m:ctrlPr>
+                                              <a:rPr lang="en-US" sz="1600" b="1" i="1">
+                                                <a:latin typeface="Cambria Math" panose="02040503050406030204" pitchFamily="18" charset="0"/>
+                                              </a:rPr>
+                                            </m:ctrlPr>
+                                          </m:dPr>
+                                          <m:e>
+                                            <m:r>
+                                              <a:rPr lang="en-US" sz="1600" b="1" i="1">
+                                                <a:latin typeface="Cambria Math" panose="02040503050406030204" pitchFamily="18" charset="0"/>
+                                              </a:rPr>
+                                              <m:t>𝟐</m:t>
+                                            </m:r>
+                                          </m:e>
+                                        </m:d>
+                                      </m:e>
+                                      <m:sup>
                                         <m:r>
                                           <a:rPr lang="en-US" sz="1600" b="1" i="1" smtClean="0">
                                             <a:latin typeface="Cambria Math" panose="02040503050406030204" pitchFamily="18" charset="0"/>
                                           </a:rPr>
-                                          <m:t>𝑿</m:t>
+                                          <m:t>𝑻</m:t>
                                         </m:r>
-                                      </m:e>
-                                    </m:acc>
-                                  </m:e>
-                                  <m:sub>
-                                    <m:r>
-                                      <a:rPr lang="en-US" sz="1600" b="0" i="1" smtClean="0">
-                                        <a:latin typeface="Cambria Math" panose="02040503050406030204" pitchFamily="18" charset="0"/>
-                                      </a:rPr>
-                                      <m:t>1</m:t>
-                                    </m:r>
-                                  </m:sub>
-                                  <m:sup>
-                                    <m:r>
-                                      <a:rPr lang="en-US" sz="1600" b="1" i="1" smtClean="0">
-                                        <a:latin typeface="Cambria Math" panose="02040503050406030204" pitchFamily="18" charset="0"/>
-                                      </a:rPr>
-                                      <m:t>𝑻</m:t>
-                                    </m:r>
+                                      </m:sup>
+                                    </m:sSup>
                                   </m:sup>
-                                </m:sSubSup>
+                                </m:sSup>
                                 <m:sSub>
                                   <m:sSubPr>
                                     <m:ctrlPr>
@@ -9408,7 +9475,7 @@
                                       <a:rPr lang="en-US" sz="1600" b="1" i="1" smtClean="0">
                                         <a:latin typeface="Cambria Math" panose="02040503050406030204" pitchFamily="18" charset="0"/>
                                       </a:rPr>
-                                      <m:t>𝑯</m:t>
+                                      <m:t>𝑷</m:t>
                                     </m:r>
                                   </m:e>
                                   <m:sub>
@@ -9440,7 +9507,7 @@
               </p:txBody>
             </p:sp>
           </mc:Choice>
-          <mc:Fallback>
+          <mc:Fallback xmlns="">
             <p:sp>
               <p:nvSpPr>
                 <p:cNvPr id="101" name="TextBox 100">
@@ -9457,8 +9524,8 @@
               </p:nvSpPr>
               <p:spPr>
                 <a:xfrm>
-                  <a:off x="10494057" y="3786198"/>
-                  <a:ext cx="1530932" cy="326693"/>
+                  <a:off x="10147491" y="3776851"/>
+                  <a:ext cx="1930528" cy="417230"/>
                 </a:xfrm>
                 <a:prstGeom prst="rect">
                   <a:avLst/>
@@ -9466,7 +9533,7 @@
                 <a:blipFill>
                   <a:blip r:embed="rId36"/>
                   <a:stretch>
-                    <a:fillRect l="-2789" r="-398" b="-20755"/>
+                    <a:fillRect l="-1262" b="-5797"/>
                   </a:stretch>
                 </a:blipFill>
               </p:spPr>
@@ -9485,8 +9552,8 @@
             </p:sp>
           </mc:Fallback>
         </mc:AlternateContent>
-        <mc:AlternateContent xmlns:mc="http://schemas.openxmlformats.org/markup-compatibility/2006">
-          <mc:Choice xmlns:a14="http://schemas.microsoft.com/office/drawing/2010/main" Requires="a14">
+        <mc:AlternateContent xmlns:mc="http://schemas.openxmlformats.org/markup-compatibility/2006" xmlns:a14="http://schemas.microsoft.com/office/drawing/2010/main">
+          <mc:Choice Requires="a14">
             <p:sp>
               <p:nvSpPr>
                 <p:cNvPr id="117" name="TextBox 116">
@@ -9501,8 +9568,8 @@
               </p:nvSpPr>
               <p:spPr>
                 <a:xfrm>
-                  <a:off x="6516194" y="6211981"/>
-                  <a:ext cx="1382430" cy="253083"/>
+                  <a:off x="6404312" y="6190357"/>
+                  <a:ext cx="1337033" cy="260969"/>
                 </a:xfrm>
                 <a:prstGeom prst="rect">
                   <a:avLst/>
@@ -9522,14 +9589,14 @@
                         <m:jc m:val="centerGroup"/>
                       </m:oMathParaPr>
                       <m:oMath xmlns:m="http://schemas.openxmlformats.org/officeDocument/2006/math">
-                        <m:sSub>
-                          <m:sSubPr>
+                        <m:sSup>
+                          <m:sSupPr>
                             <m:ctrlPr>
                               <a:rPr lang="en-US" sz="1600" b="1" i="1" smtClean="0">
                                 <a:latin typeface="Cambria Math" panose="02040503050406030204" pitchFamily="18" charset="0"/>
                               </a:rPr>
                             </m:ctrlPr>
-                          </m:sSubPr>
+                          </m:sSupPr>
                           <m:e>
                             <m:acc>
                               <m:accPr>
@@ -9550,21 +9617,72 @@
                               </m:e>
                             </m:acc>
                           </m:e>
-                          <m:sub>
+                          <m:sup>
                             <m:r>
                               <a:rPr lang="en-US" sz="1600" b="1" i="1" smtClean="0">
                                 <a:latin typeface="Cambria Math" panose="02040503050406030204" pitchFamily="18" charset="0"/>
                               </a:rPr>
+                              <m:t>(</m:t>
+                            </m:r>
+                            <m:r>
+                              <a:rPr lang="en-US" sz="1600" b="1" i="1" smtClean="0">
+                                <a:latin typeface="Cambria Math" panose="02040503050406030204" pitchFamily="18" charset="0"/>
+                              </a:rPr>
                               <m:t>𝟏</m:t>
                             </m:r>
-                          </m:sub>
-                        </m:sSub>
+                            <m:r>
+                              <a:rPr lang="en-US" sz="1600" b="1" i="1" smtClean="0">
+                                <a:latin typeface="Cambria Math" panose="02040503050406030204" pitchFamily="18" charset="0"/>
+                              </a:rPr>
+                              <m:t>)</m:t>
+                            </m:r>
+                          </m:sup>
+                        </m:sSup>
                         <m:r>
                           <a:rPr lang="en-US" sz="1600" b="1" i="1" smtClean="0">
                             <a:latin typeface="Cambria Math" panose="02040503050406030204" pitchFamily="18" charset="0"/>
                           </a:rPr>
                           <m:t>= </m:t>
                         </m:r>
+                        <m:sSubSup>
+                          <m:sSubSupPr>
+                            <m:ctrlPr>
+                              <a:rPr lang="en-US" sz="1600" b="1" i="1" smtClean="0">
+                                <a:latin typeface="Cambria Math" panose="02040503050406030204" pitchFamily="18" charset="0"/>
+                              </a:rPr>
+                            </m:ctrlPr>
+                          </m:sSubSupPr>
+                          <m:e>
+                            <m:r>
+                              <a:rPr lang="en-US" sz="1600" b="1" i="1" smtClean="0">
+                                <a:latin typeface="Cambria Math" panose="02040503050406030204" pitchFamily="18" charset="0"/>
+                              </a:rPr>
+                              <m:t>𝑷</m:t>
+                            </m:r>
+                          </m:e>
+                          <m:sub>
+                            <m:r>
+                              <a:rPr lang="en-US" sz="1600" b="1" i="1" smtClean="0">
+                                <a:latin typeface="Cambria Math" panose="02040503050406030204" pitchFamily="18" charset="0"/>
+                              </a:rPr>
+                              <m:t>𝟏</m:t>
+                            </m:r>
+                          </m:sub>
+                          <m:sup>
+                            <m:r>
+                              <a:rPr lang="en-US" sz="1600" b="1" i="1" smtClean="0">
+                                <a:latin typeface="Cambria Math" panose="02040503050406030204" pitchFamily="18" charset="0"/>
+                              </a:rPr>
+                              <m:t>𝑻</m:t>
+                            </m:r>
+                          </m:sup>
+                        </m:sSubSup>
+                        <m:r>
+                          <a:rPr lang="en-US" sz="1600" b="1" i="1" smtClean="0">
+                            <a:latin typeface="Cambria Math" panose="02040503050406030204" pitchFamily="18" charset="0"/>
+                          </a:rPr>
+                          <m:t>𝑨</m:t>
+                        </m:r>
                         <m:sSub>
                           <m:sSubPr>
                             <m:ctrlPr>
@@ -9578,69 +9696,7 @@
                               <a:rPr lang="en-US" sz="1600" b="1" i="1" smtClean="0">
                                 <a:latin typeface="Cambria Math" panose="02040503050406030204" pitchFamily="18" charset="0"/>
                               </a:rPr>
-                              <m:t>𝑯</m:t>
-                            </m:r>
-                          </m:e>
-                          <m:sub>
-                            <m:r>
-                              <a:rPr lang="en-US" sz="1600" b="1" i="1" smtClean="0">
-                                <a:latin typeface="Cambria Math" panose="02040503050406030204" pitchFamily="18" charset="0"/>
-                              </a:rPr>
-                              <m:t>𝟏</m:t>
-                            </m:r>
-                          </m:sub>
-                        </m:sSub>
-                        <m:sSub>
-                          <m:sSubPr>
-                            <m:ctrlPr>
-                              <a:rPr lang="en-US" sz="1600" b="1" i="1" smtClean="0">
-                                <a:latin typeface="Cambria Math" panose="02040503050406030204" pitchFamily="18" charset="0"/>
-                              </a:rPr>
-                            </m:ctrlPr>
-                          </m:sSubPr>
-                          <m:e>
-                            <m:acc>
-                              <m:accPr>
-                                <m:chr m:val="̃"/>
-                                <m:ctrlPr>
-                                  <a:rPr lang="en-US" sz="1600" b="1" i="1" smtClean="0">
-                                    <a:latin typeface="Cambria Math" panose="02040503050406030204" pitchFamily="18" charset="0"/>
-                                  </a:rPr>
-                                </m:ctrlPr>
-                              </m:accPr>
-                              <m:e>
-                                <m:r>
-                                  <a:rPr lang="en-US" sz="1600" b="1" i="1" smtClean="0">
-                                    <a:latin typeface="Cambria Math" panose="02040503050406030204" pitchFamily="18" charset="0"/>
-                                  </a:rPr>
-                                  <m:t>𝑿</m:t>
-                                </m:r>
-                              </m:e>
-                            </m:acc>
-                          </m:e>
-                          <m:sub>
-                            <m:r>
-                              <a:rPr lang="en-US" sz="1600" b="1" i="0" smtClean="0">
-                                <a:latin typeface="Cambria Math" panose="02040503050406030204" pitchFamily="18" charset="0"/>
-                              </a:rPr>
-                              <m:t>𝟏</m:t>
-                            </m:r>
-                          </m:sub>
-                        </m:sSub>
-                        <m:sSub>
-                          <m:sSubPr>
-                            <m:ctrlPr>
-                              <a:rPr lang="en-US" sz="1600" b="1" i="1" smtClean="0">
-                                <a:latin typeface="Cambria Math" panose="02040503050406030204" pitchFamily="18" charset="0"/>
-                              </a:rPr>
-                            </m:ctrlPr>
-                          </m:sSubPr>
-                          <m:e>
-                            <m:r>
-                              <a:rPr lang="en-US" sz="1600" b="1" i="1" smtClean="0">
-                                <a:latin typeface="Cambria Math" panose="02040503050406030204" pitchFamily="18" charset="0"/>
-                              </a:rPr>
-                              <m:t>𝑯</m:t>
+                              <m:t>𝑷</m:t>
                             </m:r>
                           </m:e>
                           <m:sub>
@@ -9660,7 +9716,7 @@
               </p:txBody>
             </p:sp>
           </mc:Choice>
-          <mc:Fallback>
+          <mc:Fallback xmlns="">
             <p:sp>
               <p:nvSpPr>
                 <p:cNvPr id="117" name="TextBox 116">
@@ -9677,8 +9733,8 @@
               </p:nvSpPr>
               <p:spPr>
                 <a:xfrm>
-                  <a:off x="6516194" y="6211981"/>
-                  <a:ext cx="1382430" cy="253083"/>
+                  <a:off x="6404312" y="6190357"/>
+                  <a:ext cx="1337033" cy="260969"/>
                 </a:xfrm>
                 <a:prstGeom prst="rect">
                   <a:avLst/>
@@ -9686,7 +9742,7 @@
                 <a:blipFill>
                   <a:blip r:embed="rId37"/>
                   <a:stretch>
-                    <a:fillRect l="-1762" t="-14634" b="-17073"/>
+                    <a:fillRect l="-3196" t="-9302" r="-913" b="-18605"/>
                   </a:stretch>
                 </a:blipFill>
               </p:spPr>
@@ -9705,8 +9761,8 @@
             </p:sp>
           </mc:Fallback>
         </mc:AlternateContent>
-        <mc:AlternateContent xmlns:mc="http://schemas.openxmlformats.org/markup-compatibility/2006">
-          <mc:Choice xmlns:a14="http://schemas.microsoft.com/office/drawing/2010/main" Requires="a14">
+        <mc:AlternateContent xmlns:mc="http://schemas.openxmlformats.org/markup-compatibility/2006" xmlns:a14="http://schemas.microsoft.com/office/drawing/2010/main">
+          <mc:Choice Requires="a14">
             <p:sp>
               <p:nvSpPr>
                 <p:cNvPr id="121" name="TextBox 120">
@@ -9722,7 +9778,7 @@
               <p:spPr>
                 <a:xfrm>
                   <a:off x="10544918" y="3092321"/>
-                  <a:ext cx="1382430" cy="253083"/>
+                  <a:ext cx="1566775" cy="260969"/>
                 </a:xfrm>
                 <a:prstGeom prst="rect">
                   <a:avLst/>
@@ -9742,14 +9798,14 @@
                         <m:jc m:val="centerGroup"/>
                       </m:oMathParaPr>
                       <m:oMath xmlns:m="http://schemas.openxmlformats.org/officeDocument/2006/math">
-                        <m:sSub>
-                          <m:sSubPr>
+                        <m:sSup>
+                          <m:sSupPr>
                             <m:ctrlPr>
                               <a:rPr lang="en-US" sz="1600" b="1" i="1" smtClean="0">
                                 <a:latin typeface="Cambria Math" panose="02040503050406030204" pitchFamily="18" charset="0"/>
                               </a:rPr>
                             </m:ctrlPr>
-                          </m:sSubPr>
+                          </m:sSupPr>
                           <m:e>
                             <m:acc>
                               <m:accPr>
@@ -9770,35 +9826,47 @@
                               </m:e>
                             </m:acc>
                           </m:e>
-                          <m:sub>
+                          <m:sup>
                             <m:r>
                               <a:rPr lang="en-US" sz="1600" b="1" i="1" smtClean="0">
                                 <a:latin typeface="Cambria Math" panose="02040503050406030204" pitchFamily="18" charset="0"/>
                               </a:rPr>
+                              <m:t>(</m:t>
+                            </m:r>
+                            <m:r>
+                              <a:rPr lang="en-US" sz="1600" b="1" i="1" smtClean="0">
+                                <a:latin typeface="Cambria Math" panose="02040503050406030204" pitchFamily="18" charset="0"/>
+                              </a:rPr>
                               <m:t>𝟐</m:t>
                             </m:r>
-                          </m:sub>
-                        </m:sSub>
+                            <m:r>
+                              <a:rPr lang="en-US" sz="1600" b="1" i="1" smtClean="0">
+                                <a:latin typeface="Cambria Math" panose="02040503050406030204" pitchFamily="18" charset="0"/>
+                              </a:rPr>
+                              <m:t>)</m:t>
+                            </m:r>
+                          </m:sup>
+                        </m:sSup>
                         <m:r>
                           <a:rPr lang="en-US" sz="1600" b="1" i="1" smtClean="0">
                             <a:latin typeface="Cambria Math" panose="02040503050406030204" pitchFamily="18" charset="0"/>
                           </a:rPr>
                           <m:t>= </m:t>
                         </m:r>
-                        <m:sSub>
-                          <m:sSubPr>
+                        <m:sSubSup>
+                          <m:sSubSupPr>
                             <m:ctrlPr>
                               <a:rPr lang="en-US" sz="1600" b="1" i="1" smtClean="0">
                                 <a:latin typeface="Cambria Math" panose="02040503050406030204" pitchFamily="18" charset="0"/>
                               </a:rPr>
                             </m:ctrlPr>
-                          </m:sSubPr>
+                          </m:sSubSupPr>
                           <m:e>
                             <m:r>
                               <a:rPr lang="en-US" sz="1600" b="1" i="1" smtClean="0">
                                 <a:latin typeface="Cambria Math" panose="02040503050406030204" pitchFamily="18" charset="0"/>
                               </a:rPr>
-                              <m:t>𝑯</m:t>
+                              <m:t>𝑷</m:t>
                             </m:r>
                           </m:e>
                           <m:sub>
@@ -9809,44 +9877,64 @@
                               <m:t>𝟐</m:t>
                             </m:r>
                           </m:sub>
-                        </m:sSub>
-                        <m:sSub>
-                          <m:sSubPr>
+                          <m:sup>
+                            <m:r>
+                              <a:rPr lang="en-US" sz="1600" b="1" i="1" smtClean="0">
+                                <a:latin typeface="Cambria Math" panose="02040503050406030204" pitchFamily="18" charset="0"/>
+                              </a:rPr>
+                              <m:t>𝑻</m:t>
+                            </m:r>
+                          </m:sup>
+                        </m:sSubSup>
+                        <m:sSup>
+                          <m:sSupPr>
                             <m:ctrlPr>
-                              <a:rPr lang="en-US" sz="1600" b="1" i="1" smtClean="0">
+                              <a:rPr lang="en-US" sz="1600" b="1" i="1">
                                 <a:latin typeface="Cambria Math" panose="02040503050406030204" pitchFamily="18" charset="0"/>
                               </a:rPr>
                             </m:ctrlPr>
-                          </m:sSubPr>
+                          </m:sSupPr>
                           <m:e>
                             <m:acc>
                               <m:accPr>
                                 <m:chr m:val="̃"/>
                                 <m:ctrlPr>
-                                  <a:rPr lang="en-US" sz="1600" b="1" i="1" smtClean="0">
+                                  <a:rPr lang="en-US" sz="1600" b="1" i="1">
                                     <a:latin typeface="Cambria Math" panose="02040503050406030204" pitchFamily="18" charset="0"/>
                                   </a:rPr>
                                 </m:ctrlPr>
                               </m:accPr>
                               <m:e>
                                 <m:r>
-                                  <a:rPr lang="en-US" sz="1600" b="1" i="1" smtClean="0">
+                                  <a:rPr lang="en-US" sz="1600" b="1" i="1">
                                     <a:latin typeface="Cambria Math" panose="02040503050406030204" pitchFamily="18" charset="0"/>
                                   </a:rPr>
-                                  <m:t>𝑿</m:t>
+                                  <m:t>𝑨</m:t>
                                 </m:r>
                               </m:e>
                             </m:acc>
                           </m:e>
-                          <m:sub>
+                          <m:sup>
                             <m:r>
-                              <a:rPr lang="en-US" sz="1600" b="1" i="0" smtClean="0">
-                                <a:latin typeface="Cambria Math" panose="02040503050406030204" pitchFamily="18" charset="0"/>
-                              </a:rPr>
-                              <m:t>𝟐</m:t>
+                              <a:rPr lang="en-US" sz="1600" b="1" i="1">
+                                <a:latin typeface="Cambria Math" panose="02040503050406030204" pitchFamily="18" charset="0"/>
+                              </a:rPr>
+                              <m:t>(</m:t>
                             </m:r>
-                          </m:sub>
-                        </m:sSub>
+                            <m:r>
+                              <a:rPr lang="en-US" sz="1600" b="1" i="1">
+                                <a:latin typeface="Cambria Math" panose="02040503050406030204" pitchFamily="18" charset="0"/>
+                              </a:rPr>
+                              <m:t>𝟏</m:t>
+                            </m:r>
+                            <m:r>
+                              <a:rPr lang="en-US" sz="1600" b="1" i="1">
+                                <a:latin typeface="Cambria Math" panose="02040503050406030204" pitchFamily="18" charset="0"/>
+                              </a:rPr>
+                              <m:t>)</m:t>
+                            </m:r>
+                          </m:sup>
+                        </m:sSup>
                         <m:sSub>
                           <m:sSubPr>
                             <m:ctrlPr>
@@ -9860,7 +9948,7 @@
                               <a:rPr lang="en-US" sz="1600" b="1" i="1" smtClean="0">
                                 <a:latin typeface="Cambria Math" panose="02040503050406030204" pitchFamily="18" charset="0"/>
                               </a:rPr>
-                              <m:t>𝑯</m:t>
+                              <m:t>𝑷</m:t>
                             </m:r>
                           </m:e>
                           <m:sub>
@@ -9880,7 +9968,7 @@
               </p:txBody>
             </p:sp>
           </mc:Choice>
-          <mc:Fallback>
+          <mc:Fallback xmlns="">
             <p:sp>
               <p:nvSpPr>
                 <p:cNvPr id="121" name="TextBox 120">
@@ -9898,7 +9986,7 @@
               <p:spPr>
                 <a:xfrm>
                   <a:off x="10544918" y="3092321"/>
-                  <a:ext cx="1382430" cy="253083"/>
+                  <a:ext cx="1566775" cy="260969"/>
                 </a:xfrm>
                 <a:prstGeom prst="rect">
                   <a:avLst/>
@@ -9906,7 +9994,7 @@
                 <a:blipFill>
                   <a:blip r:embed="rId38"/>
                   <a:stretch>
-                    <a:fillRect l="-1762" t="-11905" b="-16667"/>
+                    <a:fillRect l="-2335" t="-9302" r="-389" b="-18605"/>
                   </a:stretch>
                 </a:blipFill>
               </p:spPr>
@@ -9981,9 +10069,9 @@
             <p:nvPr/>
           </p:nvCxnSpPr>
           <p:spPr>
-            <a:xfrm>
-              <a:off x="7689115" y="5360960"/>
-              <a:ext cx="556885" cy="376"/>
+            <a:xfrm flipV="1">
+              <a:off x="7846217" y="5361336"/>
+              <a:ext cx="399783" cy="3103"/>
             </a:xfrm>
             <a:prstGeom prst="straightConnector1">
               <a:avLst/>
@@ -10008,8 +10096,8 @@
           </p:style>
         </p:cxnSp>
       </p:grpSp>
-      <mc:AlternateContent xmlns:mc="http://schemas.openxmlformats.org/markup-compatibility/2006">
-        <mc:Choice xmlns:a14="http://schemas.microsoft.com/office/drawing/2010/main" Requires="a14">
+      <mc:AlternateContent xmlns:mc="http://schemas.openxmlformats.org/markup-compatibility/2006" xmlns:a14="http://schemas.microsoft.com/office/drawing/2010/main">
+        <mc:Choice Requires="a14">
           <p:sp>
             <p:nvSpPr>
               <p:cNvPr id="2" name="TextBox 1">
@@ -10025,7 +10113,7 @@
             <p:spPr>
               <a:xfrm>
                 <a:off x="209929" y="4823934"/>
-                <a:ext cx="1108445" cy="252377"/>
+                <a:ext cx="1278363" cy="256480"/>
               </a:xfrm>
               <a:prstGeom prst="rect">
                 <a:avLst/>
@@ -10045,43 +10133,49 @@
                       <m:jc m:val="centerGroup"/>
                     </m:oMathParaPr>
                     <m:oMath xmlns:m="http://schemas.openxmlformats.org/officeDocument/2006/math">
-                      <m:sSub>
-                        <m:sSubPr>
+                      <m:sSup>
+                        <m:sSupPr>
                           <m:ctrlPr>
                             <a:rPr lang="en-US" sz="1600" b="1" i="1" smtClean="0">
                               <a:latin typeface="Cambria Math" panose="02040503050406030204" pitchFamily="18" charset="0"/>
                             </a:rPr>
                           </m:ctrlPr>
-                        </m:sSubPr>
+                        </m:sSupPr>
                         <m:e>
-                          <m:acc>
-                            <m:accPr>
-                              <m:chr m:val="̃"/>
-                              <m:ctrlPr>
-                                <a:rPr lang="en-US" sz="1600" b="1" i="1" smtClean="0">
-                                  <a:latin typeface="Cambria Math" panose="02040503050406030204" pitchFamily="18" charset="0"/>
-                                </a:rPr>
-                              </m:ctrlPr>
-                            </m:accPr>
-                            <m:e>
-                              <m:r>
-                                <a:rPr lang="en-US" sz="1600" b="1" i="1" smtClean="0">
-                                  <a:latin typeface="Cambria Math" panose="02040503050406030204" pitchFamily="18" charset="0"/>
-                                </a:rPr>
-                                <m:t>𝑿</m:t>
-                              </m:r>
-                            </m:e>
-                          </m:acc>
+                          <m:r>
+                            <a:rPr lang="en-US" sz="1600" b="1" i="1" smtClean="0">
+                              <a:latin typeface="Cambria Math" panose="02040503050406030204" pitchFamily="18" charset="0"/>
+                            </a:rPr>
+                            <m:t>𝑿</m:t>
+                          </m:r>
                         </m:e>
-                        <m:sub>
+                        <m:sup>
+                          <m:r>
+                            <a:rPr lang="en-US" sz="1600" b="1" i="1">
+                              <a:latin typeface="Cambria Math" panose="02040503050406030204" pitchFamily="18" charset="0"/>
+                            </a:rPr>
+                            <m:t>(</m:t>
+                          </m:r>
                           <m:r>
                             <a:rPr lang="en-US" sz="1600" b="1" i="1" smtClean="0">
                               <a:latin typeface="Cambria Math" panose="02040503050406030204" pitchFamily="18" charset="0"/>
                             </a:rPr>
                             <m:t>𝟏</m:t>
                           </m:r>
-                        </m:sub>
-                      </m:sSub>
+                          <m:r>
+                            <a:rPr lang="en-US" sz="1600" b="1" i="1">
+                              <a:latin typeface="Cambria Math" panose="02040503050406030204" pitchFamily="18" charset="0"/>
+                            </a:rPr>
+                            <m:t>)</m:t>
+                          </m:r>
+                        </m:sup>
+                      </m:sSup>
+                      <m:r>
+                        <a:rPr lang="en-US" sz="1600" b="1" i="1">
+                          <a:latin typeface="Cambria Math" panose="02040503050406030204" pitchFamily="18" charset="0"/>
+                        </a:rPr>
+                        <m:t> </m:t>
+                      </m:r>
                       <m:r>
                         <a:rPr lang="en-US" sz="1600" b="1" i="1" smtClean="0">
                           <a:latin typeface="Cambria Math" panose="02040503050406030204" pitchFamily="18" charset="0"/>
@@ -10159,7 +10253,7 @@
             </p:txBody>
           </p:sp>
         </mc:Choice>
-        <mc:Fallback>
+        <mc:Fallback xmlns="">
           <p:sp>
             <p:nvSpPr>
               <p:cNvPr id="2" name="TextBox 1">
@@ -10177,7 +10271,7 @@
             <p:spPr>
               <a:xfrm>
                 <a:off x="209929" y="4823934"/>
-                <a:ext cx="1108445" cy="252377"/>
+                <a:ext cx="1278363" cy="256480"/>
               </a:xfrm>
               <a:prstGeom prst="rect">
                 <a:avLst/>
@@ -10185,7 +10279,7 @@
               <a:blipFill>
                 <a:blip r:embed="rId39"/>
                 <a:stretch>
-                  <a:fillRect l="-3297" t="-11905" r="-549" b="-16667"/>
+                  <a:fillRect l="-2857" t="-4762" r="-476" b="-7143"/>
                 </a:stretch>
               </a:blipFill>
             </p:spPr>
@@ -10204,8 +10298,8 @@
           </p:sp>
         </mc:Fallback>
       </mc:AlternateContent>
-      <mc:AlternateContent xmlns:mc="http://schemas.openxmlformats.org/markup-compatibility/2006">
-        <mc:Choice xmlns:a14="http://schemas.microsoft.com/office/drawing/2010/main" Requires="a14">
+      <mc:AlternateContent xmlns:mc="http://schemas.openxmlformats.org/markup-compatibility/2006" xmlns:a14="http://schemas.microsoft.com/office/drawing/2010/main">
+        <mc:Choice Requires="a14">
           <p:sp>
             <p:nvSpPr>
               <p:cNvPr id="3" name="TextBox 2">
@@ -10221,7 +10315,7 @@
             <p:spPr>
               <a:xfrm>
                 <a:off x="1559985" y="3754370"/>
-                <a:ext cx="1108445" cy="252377"/>
+                <a:ext cx="1233478" cy="256480"/>
               </a:xfrm>
               <a:prstGeom prst="rect">
                 <a:avLst/>
@@ -10241,20 +10335,20 @@
                       <m:jc m:val="centerGroup"/>
                     </m:oMathParaPr>
                     <m:oMath xmlns:m="http://schemas.openxmlformats.org/officeDocument/2006/math">
-                      <m:sSub>
-                        <m:sSubPr>
+                      <m:sSup>
+                        <m:sSupPr>
                           <m:ctrlPr>
                             <a:rPr lang="en-US" sz="1600" b="1" i="1" smtClean="0">
                               <a:latin typeface="Cambria Math" panose="02040503050406030204" pitchFamily="18" charset="0"/>
                             </a:rPr>
                           </m:ctrlPr>
-                        </m:sSubPr>
+                        </m:sSupPr>
                         <m:e>
                           <m:acc>
                             <m:accPr>
                               <m:chr m:val="̃"/>
                               <m:ctrlPr>
-                                <a:rPr lang="en-US" sz="1600" b="1" i="1" smtClean="0">
+                                <a:rPr lang="en-US" sz="1600" b="1" i="1">
                                   <a:latin typeface="Cambria Math" panose="02040503050406030204" pitchFamily="18" charset="0"/>
                                 </a:rPr>
                               </m:ctrlPr>
@@ -10269,15 +10363,27 @@
                             </m:e>
                           </m:acc>
                         </m:e>
-                        <m:sub>
+                        <m:sup>
                           <m:r>
-                            <a:rPr lang="en-US" sz="1600" b="1" i="1" smtClean="0">
+                            <a:rPr lang="en-US" sz="1600" b="1" i="1">
+                              <a:latin typeface="Cambria Math" panose="02040503050406030204" pitchFamily="18" charset="0"/>
+                            </a:rPr>
+                            <m:t>(</m:t>
+                          </m:r>
+                          <m:r>
+                            <a:rPr lang="en-US" sz="1600" b="1" i="1">
                               <a:latin typeface="Cambria Math" panose="02040503050406030204" pitchFamily="18" charset="0"/>
                             </a:rPr>
                             <m:t>𝟐</m:t>
                           </m:r>
-                        </m:sub>
-                      </m:sSub>
+                          <m:r>
+                            <a:rPr lang="en-US" sz="1600" b="1" i="1">
+                              <a:latin typeface="Cambria Math" panose="02040503050406030204" pitchFamily="18" charset="0"/>
+                            </a:rPr>
+                            <m:t>)</m:t>
+                          </m:r>
+                        </m:sup>
+                      </m:sSup>
                       <m:r>
                         <a:rPr lang="en-US" sz="1600" b="1" i="1" smtClean="0">
                           <a:latin typeface="Cambria Math" panose="02040503050406030204" pitchFamily="18" charset="0"/>
@@ -10355,7 +10461,7 @@
             </p:txBody>
           </p:sp>
         </mc:Choice>
-        <mc:Fallback>
+        <mc:Fallback xmlns="">
           <p:sp>
             <p:nvSpPr>
               <p:cNvPr id="3" name="TextBox 2">
@@ -10373,7 +10479,7 @@
             <p:spPr>
               <a:xfrm>
                 <a:off x="1559985" y="3754370"/>
-                <a:ext cx="1108445" cy="252377"/>
+                <a:ext cx="1233478" cy="256480"/>
               </a:xfrm>
               <a:prstGeom prst="rect">
                 <a:avLst/>
@@ -10381,7 +10487,7 @@
               <a:blipFill>
                 <a:blip r:embed="rId40"/>
                 <a:stretch>
-                  <a:fillRect l="-3846" t="-14634" r="-549" b="-17073"/>
+                  <a:fillRect l="-3465" t="-14286" r="-990" b="-4762"/>
                 </a:stretch>
               </a:blipFill>
             </p:spPr>
@@ -10400,8 +10506,8 @@
           </p:sp>
         </mc:Fallback>
       </mc:AlternateContent>
-      <mc:AlternateContent xmlns:mc="http://schemas.openxmlformats.org/markup-compatibility/2006">
-        <mc:Choice xmlns:a14="http://schemas.microsoft.com/office/drawing/2010/main" Requires="a14">
+      <mc:AlternateContent xmlns:mc="http://schemas.openxmlformats.org/markup-compatibility/2006" xmlns:a14="http://schemas.microsoft.com/office/drawing/2010/main">
+        <mc:Choice Requires="a14">
           <p:sp>
             <p:nvSpPr>
               <p:cNvPr id="24" name="TextBox 23">
@@ -10505,7 +10611,7 @@
             </p:txBody>
           </p:sp>
         </mc:Choice>
-        <mc:Fallback>
+        <mc:Fallback xmlns="">
           <p:sp>
             <p:nvSpPr>
               <p:cNvPr id="24" name="TextBox 23">
@@ -10567,7 +10673,7 @@
             <p:spPr>
               <a:xfrm>
                 <a:off x="467069" y="6193548"/>
-                <a:ext cx="1680012" cy="369332"/>
+                <a:ext cx="2425151" cy="369332"/>
               </a:xfrm>
               <a:prstGeom prst="rect">
                 <a:avLst/>
@@ -10580,131 +10686,130 @@
               </a:bodyPr>
               <a:lstStyle/>
               <a:p>
+                <a:r>
+                  <a:rPr lang="en-US" b="0" dirty="0"/>
+                  <a:t>Where:  </a:t>
+                </a:r>
                 <a14:m>
-                  <m:oMathPara xmlns:m="http://schemas.openxmlformats.org/officeDocument/2006/math">
-                    <m:oMathParaPr>
-                      <m:jc m:val="centerGroup"/>
-                    </m:oMathParaPr>
-                    <m:oMath xmlns:m="http://schemas.openxmlformats.org/officeDocument/2006/math">
-                      <m:sSub>
-                        <m:sSubPr>
-                          <m:ctrlPr>
-                            <a:rPr lang="en-US" b="0" i="1" smtClean="0">
-                              <a:latin typeface="Cambria Math" panose="02040503050406030204" pitchFamily="18" charset="0"/>
-                            </a:rPr>
-                          </m:ctrlPr>
-                        </m:sSubPr>
-                        <m:e>
-                          <m:r>
-                            <a:rPr lang="en-US" b="0" i="1" smtClean="0">
-                              <a:latin typeface="Cambria Math" panose="02040503050406030204" pitchFamily="18" charset="0"/>
-                            </a:rPr>
-                            <m:t>𝐿</m:t>
-                          </m:r>
-                        </m:e>
-                        <m:sub>
-                          <m:r>
-                            <a:rPr lang="en-US" b="0" i="1" smtClean="0">
-                              <a:latin typeface="Cambria Math" panose="02040503050406030204" pitchFamily="18" charset="0"/>
-                            </a:rPr>
-                            <m:t>𝑅</m:t>
-                          </m:r>
-                        </m:sub>
-                      </m:sSub>
-                      <m:r>
-                        <a:rPr lang="en-US" b="0" i="1" smtClean="0">
-                          <a:latin typeface="Cambria Math" panose="02040503050406030204" pitchFamily="18" charset="0"/>
-                        </a:rPr>
-                        <m:t>=</m:t>
-                      </m:r>
-                      <m:sSub>
-                        <m:sSubPr>
-                          <m:ctrlPr>
-                            <a:rPr lang="en-US" b="0" i="1" smtClean="0">
-                              <a:latin typeface="Cambria Math" panose="02040503050406030204" pitchFamily="18" charset="0"/>
-                            </a:rPr>
-                          </m:ctrlPr>
-                        </m:sSubPr>
-                        <m:e>
-                          <m:r>
-                            <a:rPr lang="en-US" b="0" i="1" smtClean="0">
-                              <a:latin typeface="Cambria Math" panose="02040503050406030204" pitchFamily="18" charset="0"/>
-                            </a:rPr>
-                            <m:t>𝐿</m:t>
-                          </m:r>
-                        </m:e>
-                        <m:sub>
-                          <m:acc>
-                            <m:accPr>
-                              <m:chr m:val="̂"/>
-                              <m:ctrlPr>
-                                <a:rPr lang="en-US" b="0" i="1" smtClean="0">
-                                  <a:latin typeface="Cambria Math" panose="02040503050406030204" pitchFamily="18" charset="0"/>
-                                </a:rPr>
-                              </m:ctrlPr>
-                            </m:accPr>
-                            <m:e>
-                              <m:r>
-                                <a:rPr lang="en-US" b="0" i="1" smtClean="0">
-                                  <a:latin typeface="Cambria Math" panose="02040503050406030204" pitchFamily="18" charset="0"/>
-                                </a:rPr>
-                                <m:t>𝑋</m:t>
-                              </m:r>
-                            </m:e>
-                          </m:acc>
-                        </m:sub>
-                      </m:sSub>
-                      <m:r>
-                        <a:rPr lang="en-US" b="0" i="1" smtClean="0">
-                          <a:latin typeface="Cambria Math" panose="02040503050406030204" pitchFamily="18" charset="0"/>
-                        </a:rPr>
-                        <m:t>+</m:t>
-                      </m:r>
-                      <m:sSub>
-                        <m:sSubPr>
-                          <m:ctrlPr>
-                            <a:rPr lang="en-US" b="0" i="1" smtClean="0">
-                              <a:latin typeface="Cambria Math" panose="02040503050406030204" pitchFamily="18" charset="0"/>
-                            </a:rPr>
-                          </m:ctrlPr>
-                        </m:sSubPr>
-                        <m:e>
-                          <m:r>
-                            <a:rPr lang="en-US" b="0" i="1" smtClean="0">
-                              <a:latin typeface="Cambria Math" panose="02040503050406030204" pitchFamily="18" charset="0"/>
-                            </a:rPr>
-                            <m:t>𝛾</m:t>
-                          </m:r>
-                          <m:r>
-                            <a:rPr lang="en-US" b="0" i="1" smtClean="0">
-                              <a:latin typeface="Cambria Math" panose="02040503050406030204" pitchFamily="18" charset="0"/>
-                            </a:rPr>
-                            <m:t>𝐿</m:t>
-                          </m:r>
-                        </m:e>
-                        <m:sub>
-                          <m:acc>
-                            <m:accPr>
-                              <m:chr m:val="̂"/>
-                              <m:ctrlPr>
-                                <a:rPr lang="en-US" b="0" i="1" smtClean="0">
-                                  <a:latin typeface="Cambria Math" panose="02040503050406030204" pitchFamily="18" charset="0"/>
-                                </a:rPr>
-                              </m:ctrlPr>
-                            </m:accPr>
-                            <m:e>
-                              <m:r>
-                                <a:rPr lang="en-US" b="0" i="1" smtClean="0">
-                                  <a:latin typeface="Cambria Math" panose="02040503050406030204" pitchFamily="18" charset="0"/>
-                                </a:rPr>
-                                <m:t>𝐴</m:t>
-                              </m:r>
-                            </m:e>
-                          </m:acc>
-                        </m:sub>
-                      </m:sSub>
-                    </m:oMath>
-                  </m:oMathPara>
+                  <m:oMath xmlns:m="http://schemas.openxmlformats.org/officeDocument/2006/math">
+                    <m:sSub>
+                      <m:sSubPr>
+                        <m:ctrlPr>
+                          <a:rPr lang="en-US" b="0" i="1" smtClean="0">
+                            <a:latin typeface="Cambria Math" panose="02040503050406030204" pitchFamily="18" charset="0"/>
+                          </a:rPr>
+                        </m:ctrlPr>
+                      </m:sSubPr>
+                      <m:e>
+                        <m:r>
+                          <a:rPr lang="en-US" b="0" i="1" smtClean="0">
+                            <a:latin typeface="Cambria Math" panose="02040503050406030204" pitchFamily="18" charset="0"/>
+                          </a:rPr>
+                          <m:t>𝐿</m:t>
+                        </m:r>
+                      </m:e>
+                      <m:sub>
+                        <m:r>
+                          <a:rPr lang="en-US" b="0" i="1" smtClean="0">
+                            <a:latin typeface="Cambria Math" panose="02040503050406030204" pitchFamily="18" charset="0"/>
+                          </a:rPr>
+                          <m:t>𝑅</m:t>
+                        </m:r>
+                      </m:sub>
+                    </m:sSub>
+                    <m:r>
+                      <a:rPr lang="en-US" b="0" i="1" smtClean="0">
+                        <a:latin typeface="Cambria Math" panose="02040503050406030204" pitchFamily="18" charset="0"/>
+                      </a:rPr>
+                      <m:t>=</m:t>
+                    </m:r>
+                    <m:sSub>
+                      <m:sSubPr>
+                        <m:ctrlPr>
+                          <a:rPr lang="en-US" b="0" i="1" smtClean="0">
+                            <a:latin typeface="Cambria Math" panose="02040503050406030204" pitchFamily="18" charset="0"/>
+                          </a:rPr>
+                        </m:ctrlPr>
+                      </m:sSubPr>
+                      <m:e>
+                        <m:r>
+                          <a:rPr lang="en-US" b="0" i="1" smtClean="0">
+                            <a:latin typeface="Cambria Math" panose="02040503050406030204" pitchFamily="18" charset="0"/>
+                          </a:rPr>
+                          <m:t>𝐿</m:t>
+                        </m:r>
+                      </m:e>
+                      <m:sub>
+                        <m:acc>
+                          <m:accPr>
+                            <m:chr m:val="̂"/>
+                            <m:ctrlPr>
+                              <a:rPr lang="en-US" b="0" i="1" smtClean="0">
+                                <a:latin typeface="Cambria Math" panose="02040503050406030204" pitchFamily="18" charset="0"/>
+                              </a:rPr>
+                            </m:ctrlPr>
+                          </m:accPr>
+                          <m:e>
+                            <m:r>
+                              <a:rPr lang="en-US" b="0" i="1" smtClean="0">
+                                <a:latin typeface="Cambria Math" panose="02040503050406030204" pitchFamily="18" charset="0"/>
+                              </a:rPr>
+                              <m:t>𝐴</m:t>
+                            </m:r>
+                          </m:e>
+                        </m:acc>
+                      </m:sub>
+                    </m:sSub>
+                    <m:r>
+                      <a:rPr lang="en-US" b="0" i="1" smtClean="0">
+                        <a:latin typeface="Cambria Math" panose="02040503050406030204" pitchFamily="18" charset="0"/>
+                      </a:rPr>
+                      <m:t>+</m:t>
+                    </m:r>
+                    <m:r>
+                      <a:rPr lang="en-US" b="0" i="1" smtClean="0">
+                        <a:latin typeface="Cambria Math" panose="02040503050406030204" pitchFamily="18" charset="0"/>
+                      </a:rPr>
+                      <m:t>𝛾</m:t>
+                    </m:r>
+                    <m:sSub>
+                      <m:sSubPr>
+                        <m:ctrlPr>
+                          <a:rPr lang="en-US" i="1">
+                            <a:latin typeface="Cambria Math" panose="02040503050406030204" pitchFamily="18" charset="0"/>
+                          </a:rPr>
+                        </m:ctrlPr>
+                      </m:sSubPr>
+                      <m:e>
+                        <m:r>
+                          <a:rPr lang="en-US" i="1">
+                            <a:latin typeface="Cambria Math" panose="02040503050406030204" pitchFamily="18" charset="0"/>
+                          </a:rPr>
+                          <m:t>𝐿</m:t>
+                        </m:r>
+                      </m:e>
+                      <m:sub>
+                        <m:acc>
+                          <m:accPr>
+                            <m:chr m:val="̂"/>
+                            <m:ctrlPr>
+                              <a:rPr lang="en-US" i="1">
+                                <a:latin typeface="Cambria Math" panose="02040503050406030204" pitchFamily="18" charset="0"/>
+                              </a:rPr>
+                            </m:ctrlPr>
+                          </m:accPr>
+                          <m:e>
+                            <m:r>
+                              <a:rPr lang="en-US" i="1">
+                                <a:latin typeface="Cambria Math" panose="02040503050406030204" pitchFamily="18" charset="0"/>
+                              </a:rPr>
+                              <m:t>𝑋</m:t>
+                            </m:r>
+                          </m:e>
+                        </m:acc>
+                      </m:sub>
+                    </m:sSub>
+                  </m:oMath>
                 </a14:m>
                 <a:endParaRPr lang="en-US" dirty="0"/>
               </a:p>
@@ -10729,7 +10834,7 @@
             <p:spPr>
               <a:xfrm>
                 <a:off x="467069" y="6193548"/>
-                <a:ext cx="1680012" cy="369332"/>
+                <a:ext cx="2425151" cy="369332"/>
               </a:xfrm>
               <a:prstGeom prst="rect">
                 <a:avLst/>
@@ -10737,7 +10842,7 @@
               <a:blipFill>
                 <a:blip r:embed="rId42"/>
                 <a:stretch>
-                  <a:fillRect r="-8364" b="-9836"/>
+                  <a:fillRect l="-2267" t="-8197" r="-6045" b="-24590"/>
                 </a:stretch>
               </a:blipFill>
             </p:spPr>

</xml_diff>